<commit_message>
Mise à jour du pptx
</commit_message>
<xml_diff>
--- a/slides.pptx
+++ b/slides.pptx
@@ -7,15 +7,17 @@
   <p:sldIdLst>
     <p:sldId id="256" r:id="rId2"/>
     <p:sldId id="257" r:id="rId3"/>
-    <p:sldId id="258" r:id="rId4"/>
-    <p:sldId id="259" r:id="rId5"/>
-    <p:sldId id="260" r:id="rId6"/>
-    <p:sldId id="261" r:id="rId7"/>
-    <p:sldId id="263" r:id="rId8"/>
-    <p:sldId id="264" r:id="rId9"/>
-    <p:sldId id="265" r:id="rId10"/>
-    <p:sldId id="266" r:id="rId11"/>
-    <p:sldId id="267" r:id="rId12"/>
+    <p:sldId id="269" r:id="rId4"/>
+    <p:sldId id="258" r:id="rId5"/>
+    <p:sldId id="259" r:id="rId6"/>
+    <p:sldId id="260" r:id="rId7"/>
+    <p:sldId id="261" r:id="rId8"/>
+    <p:sldId id="263" r:id="rId9"/>
+    <p:sldId id="264" r:id="rId10"/>
+    <p:sldId id="265" r:id="rId11"/>
+    <p:sldId id="266" r:id="rId12"/>
+    <p:sldId id="267" r:id="rId13"/>
+    <p:sldId id="268" r:id="rId14"/>
   </p:sldIdLst>
   <p:sldSz cx="12192000" cy="6858000"/>
   <p:notesSz cx="6858000" cy="9144000"/>
@@ -114,6 +116,11 @@
       </a:defRPr>
     </a:lvl9pPr>
   </p:defaultTextStyle>
+  <p:extLst>
+    <p:ext uri="{EFAFB233-063F-42B5-8137-9DF3F51BA10A}">
+      <p15:sldGuideLst xmlns:p15="http://schemas.microsoft.com/office/powerpoint/2012/main"/>
+    </p:ext>
+  </p:extLst>
 </p:presentation>
 </file>
 
@@ -264,7 +271,7 @@
           <a:p>
             <a:fld id="{02B4917C-6850-D543-9CDA-2935ED37DAAD}" type="datetimeFigureOut">
               <a:rPr lang="fr-FR" smtClean="0"/>
-              <a:t>08/02/2025</a:t>
+              <a:t>09/02/2025</a:t>
             </a:fld>
             <a:endParaRPr lang="fr-FR"/>
           </a:p>
@@ -462,7 +469,7 @@
           <a:p>
             <a:fld id="{02B4917C-6850-D543-9CDA-2935ED37DAAD}" type="datetimeFigureOut">
               <a:rPr lang="fr-FR" smtClean="0"/>
-              <a:t>08/02/2025</a:t>
+              <a:t>09/02/2025</a:t>
             </a:fld>
             <a:endParaRPr lang="fr-FR"/>
           </a:p>
@@ -670,7 +677,7 @@
           <a:p>
             <a:fld id="{02B4917C-6850-D543-9CDA-2935ED37DAAD}" type="datetimeFigureOut">
               <a:rPr lang="fr-FR" smtClean="0"/>
-              <a:t>08/02/2025</a:t>
+              <a:t>09/02/2025</a:t>
             </a:fld>
             <a:endParaRPr lang="fr-FR"/>
           </a:p>
@@ -868,7 +875,7 @@
           <a:p>
             <a:fld id="{02B4917C-6850-D543-9CDA-2935ED37DAAD}" type="datetimeFigureOut">
               <a:rPr lang="fr-FR" smtClean="0"/>
-              <a:t>08/02/2025</a:t>
+              <a:t>09/02/2025</a:t>
             </a:fld>
             <a:endParaRPr lang="fr-FR"/>
           </a:p>
@@ -1143,7 +1150,7 @@
           <a:p>
             <a:fld id="{02B4917C-6850-D543-9CDA-2935ED37DAAD}" type="datetimeFigureOut">
               <a:rPr lang="fr-FR" smtClean="0"/>
-              <a:t>08/02/2025</a:t>
+              <a:t>09/02/2025</a:t>
             </a:fld>
             <a:endParaRPr lang="fr-FR"/>
           </a:p>
@@ -1408,7 +1415,7 @@
           <a:p>
             <a:fld id="{02B4917C-6850-D543-9CDA-2935ED37DAAD}" type="datetimeFigureOut">
               <a:rPr lang="fr-FR" smtClean="0"/>
-              <a:t>08/02/2025</a:t>
+              <a:t>09/02/2025</a:t>
             </a:fld>
             <a:endParaRPr lang="fr-FR"/>
           </a:p>
@@ -1820,7 +1827,7 @@
           <a:p>
             <a:fld id="{02B4917C-6850-D543-9CDA-2935ED37DAAD}" type="datetimeFigureOut">
               <a:rPr lang="fr-FR" smtClean="0"/>
-              <a:t>08/02/2025</a:t>
+              <a:t>09/02/2025</a:t>
             </a:fld>
             <a:endParaRPr lang="fr-FR"/>
           </a:p>
@@ -1961,7 +1968,7 @@
           <a:p>
             <a:fld id="{02B4917C-6850-D543-9CDA-2935ED37DAAD}" type="datetimeFigureOut">
               <a:rPr lang="fr-FR" smtClean="0"/>
-              <a:t>08/02/2025</a:t>
+              <a:t>09/02/2025</a:t>
             </a:fld>
             <a:endParaRPr lang="fr-FR"/>
           </a:p>
@@ -2074,7 +2081,7 @@
           <a:p>
             <a:fld id="{02B4917C-6850-D543-9CDA-2935ED37DAAD}" type="datetimeFigureOut">
               <a:rPr lang="fr-FR" smtClean="0"/>
-              <a:t>08/02/2025</a:t>
+              <a:t>09/02/2025</a:t>
             </a:fld>
             <a:endParaRPr lang="fr-FR"/>
           </a:p>
@@ -2385,7 +2392,7 @@
           <a:p>
             <a:fld id="{02B4917C-6850-D543-9CDA-2935ED37DAAD}" type="datetimeFigureOut">
               <a:rPr lang="fr-FR" smtClean="0"/>
-              <a:t>08/02/2025</a:t>
+              <a:t>09/02/2025</a:t>
             </a:fld>
             <a:endParaRPr lang="fr-FR"/>
           </a:p>
@@ -2673,7 +2680,7 @@
           <a:p>
             <a:fld id="{02B4917C-6850-D543-9CDA-2935ED37DAAD}" type="datetimeFigureOut">
               <a:rPr lang="fr-FR" smtClean="0"/>
-              <a:t>08/02/2025</a:t>
+              <a:t>09/02/2025</a:t>
             </a:fld>
             <a:endParaRPr lang="fr-FR"/>
           </a:p>
@@ -2914,7 +2921,7 @@
           <a:p>
             <a:fld id="{02B4917C-6850-D543-9CDA-2935ED37DAAD}" type="datetimeFigureOut">
               <a:rPr lang="fr-FR" smtClean="0"/>
-              <a:t>08/02/2025</a:t>
+              <a:t>09/02/2025</a:t>
             </a:fld>
             <a:endParaRPr lang="fr-FR"/>
           </a:p>
@@ -3476,7 +3483,7 @@
           <a:p>
             <a:r>
               <a:rPr lang="fr-FR" dirty="0"/>
-              <a:t>Arg 7</a:t>
+              <a:t>Arg 4</a:t>
             </a:r>
           </a:p>
           <a:p>
@@ -3504,7 +3511,57 @@
           <a:p>
             <a:r>
               <a:rPr lang="fr-FR" dirty="0"/>
-              <a:t>Transition</a:t>
+              <a:t>Arg 5</a:t>
+            </a:r>
+          </a:p>
+          <a:p>
+            <a:pPr lvl="1"/>
+            <a:r>
+              <a:rPr lang="fr-FR" dirty="0" err="1"/>
+              <a:t>Sub</a:t>
+            </a:r>
+            <a:r>
+              <a:rPr lang="fr-FR" dirty="0"/>
+              <a:t> arg 1</a:t>
+            </a:r>
+          </a:p>
+          <a:p>
+            <a:pPr lvl="1"/>
+            <a:r>
+              <a:rPr lang="fr-FR" dirty="0" err="1"/>
+              <a:t>Sub</a:t>
+            </a:r>
+            <a:r>
+              <a:rPr lang="fr-FR" dirty="0"/>
+              <a:t> arg 2</a:t>
+            </a:r>
+          </a:p>
+          <a:p>
+            <a:r>
+              <a:rPr lang="fr-FR" dirty="0"/>
+              <a:t>Arg 6</a:t>
+            </a:r>
+          </a:p>
+          <a:p>
+            <a:pPr lvl="1"/>
+            <a:r>
+              <a:rPr lang="fr-FR" dirty="0" err="1"/>
+              <a:t>Sub</a:t>
+            </a:r>
+            <a:r>
+              <a:rPr lang="fr-FR" dirty="0"/>
+              <a:t> arg 1</a:t>
+            </a:r>
+          </a:p>
+          <a:p>
+            <a:pPr lvl="1"/>
+            <a:r>
+              <a:rPr lang="fr-FR" dirty="0" err="1"/>
+              <a:t>Sub</a:t>
+            </a:r>
+            <a:r>
+              <a:rPr lang="fr-FR" dirty="0"/>
+              <a:t> arg 2</a:t>
             </a:r>
           </a:p>
         </p:txBody>
@@ -3512,7 +3569,7 @@
     </p:spTree>
     <p:extLst>
       <p:ext uri="{BB962C8B-B14F-4D97-AF65-F5344CB8AC3E}">
-        <p14:creationId xmlns:p14="http://schemas.microsoft.com/office/powerpoint/2010/main" val="1448163421"/>
+        <p14:creationId xmlns:p14="http://schemas.microsoft.com/office/powerpoint/2010/main" val="3683918389"/>
       </p:ext>
     </p:extLst>
   </p:cSld>
@@ -3626,7 +3683,204 @@
     </p:spTree>
     <p:extLst>
       <p:ext uri="{BB962C8B-B14F-4D97-AF65-F5344CB8AC3E}">
+        <p14:creationId xmlns:p14="http://schemas.microsoft.com/office/powerpoint/2010/main" val="1448163421"/>
+      </p:ext>
+    </p:extLst>
+  </p:cSld>
+  <p:clrMapOvr>
+    <a:masterClrMapping/>
+  </p:clrMapOvr>
+</p:sld>
+</file>
+
+<file path=ppt/slides/slide12.xml><?xml version="1.0" encoding="utf-8"?>
+<p:sld xmlns:a="http://schemas.openxmlformats.org/drawingml/2006/main" xmlns:r="http://schemas.openxmlformats.org/officeDocument/2006/relationships" xmlns:p="http://schemas.openxmlformats.org/presentationml/2006/main">
+  <p:cSld>
+    <p:spTree>
+      <p:nvGrpSpPr>
+        <p:cNvPr id="1" name=""/>
+        <p:cNvGrpSpPr/>
+        <p:nvPr/>
+      </p:nvGrpSpPr>
+      <p:grpSpPr>
+        <a:xfrm>
+          <a:off x="0" y="0"/>
+          <a:ext cx="0" cy="0"/>
+          <a:chOff x="0" y="0"/>
+          <a:chExt cx="0" cy="0"/>
+        </a:xfrm>
+      </p:grpSpPr>
+      <p:sp>
+        <p:nvSpPr>
+          <p:cNvPr id="2" name="Titre 1">
+            <a:extLst>
+              <a:ext uri="{FF2B5EF4-FFF2-40B4-BE49-F238E27FC236}">
+                <a16:creationId xmlns:a16="http://schemas.microsoft.com/office/drawing/2014/main" id="{3AE29807-5EE9-D086-72BF-25583740A81F}"/>
+              </a:ext>
+            </a:extLst>
+          </p:cNvPr>
+          <p:cNvSpPr>
+            <a:spLocks noGrp="1"/>
+          </p:cNvSpPr>
+          <p:nvPr>
+            <p:ph type="title"/>
+          </p:nvPr>
+        </p:nvSpPr>
+        <p:spPr/>
+        <p:txBody>
+          <a:bodyPr/>
+          <a:lstStyle/>
+          <a:p>
+            <a:r>
+              <a:rPr lang="fr-FR" dirty="0"/>
+              <a:t>Culture clash</a:t>
+            </a:r>
+          </a:p>
+        </p:txBody>
+      </p:sp>
+      <p:sp>
+        <p:nvSpPr>
+          <p:cNvPr id="3" name="Espace réservé du contenu 2">
+            <a:extLst>
+              <a:ext uri="{FF2B5EF4-FFF2-40B4-BE49-F238E27FC236}">
+                <a16:creationId xmlns:a16="http://schemas.microsoft.com/office/drawing/2014/main" id="{F19D04C4-A8EC-B9EB-9047-9DA7E0C0E8A8}"/>
+              </a:ext>
+            </a:extLst>
+          </p:cNvPr>
+          <p:cNvSpPr>
+            <a:spLocks noGrp="1"/>
+          </p:cNvSpPr>
+          <p:nvPr>
+            <p:ph idx="1"/>
+          </p:nvPr>
+        </p:nvSpPr>
+        <p:spPr/>
+        <p:txBody>
+          <a:bodyPr/>
+          <a:lstStyle/>
+          <a:p>
+            <a:r>
+              <a:rPr lang="fr-FR" dirty="0"/>
+              <a:t>Arg 7</a:t>
+            </a:r>
+          </a:p>
+          <a:p>
+            <a:pPr lvl="1"/>
+            <a:r>
+              <a:rPr lang="fr-FR" dirty="0" err="1"/>
+              <a:t>Sub</a:t>
+            </a:r>
+            <a:r>
+              <a:rPr lang="fr-FR" dirty="0"/>
+              <a:t> arg 1</a:t>
+            </a:r>
+          </a:p>
+          <a:p>
+            <a:pPr lvl="1"/>
+            <a:r>
+              <a:rPr lang="fr-FR" dirty="0" err="1"/>
+              <a:t>Sub</a:t>
+            </a:r>
+            <a:r>
+              <a:rPr lang="fr-FR" dirty="0"/>
+              <a:t> arg 2</a:t>
+            </a:r>
+          </a:p>
+          <a:p>
+            <a:r>
+              <a:rPr lang="fr-FR" dirty="0"/>
+              <a:t>Transition</a:t>
+            </a:r>
+          </a:p>
+        </p:txBody>
+      </p:sp>
+    </p:spTree>
+    <p:extLst>
+      <p:ext uri="{BB962C8B-B14F-4D97-AF65-F5344CB8AC3E}">
         <p14:creationId xmlns:p14="http://schemas.microsoft.com/office/powerpoint/2010/main" val="1661682614"/>
+      </p:ext>
+    </p:extLst>
+  </p:cSld>
+  <p:clrMapOvr>
+    <a:masterClrMapping/>
+  </p:clrMapOvr>
+</p:sld>
+</file>
+
+<file path=ppt/slides/slide13.xml><?xml version="1.0" encoding="utf-8"?>
+<p:sld xmlns:a="http://schemas.openxmlformats.org/drawingml/2006/main" xmlns:r="http://schemas.openxmlformats.org/officeDocument/2006/relationships" xmlns:p="http://schemas.openxmlformats.org/presentationml/2006/main">
+  <p:cSld>
+    <p:spTree>
+      <p:nvGrpSpPr>
+        <p:cNvPr id="1" name=""/>
+        <p:cNvGrpSpPr/>
+        <p:nvPr/>
+      </p:nvGrpSpPr>
+      <p:grpSpPr>
+        <a:xfrm>
+          <a:off x="0" y="0"/>
+          <a:ext cx="0" cy="0"/>
+          <a:chOff x="0" y="0"/>
+          <a:chExt cx="0" cy="0"/>
+        </a:xfrm>
+      </p:grpSpPr>
+      <p:sp>
+        <p:nvSpPr>
+          <p:cNvPr id="2" name="Titre 1">
+            <a:extLst>
+              <a:ext uri="{FF2B5EF4-FFF2-40B4-BE49-F238E27FC236}">
+                <a16:creationId xmlns:a16="http://schemas.microsoft.com/office/drawing/2014/main" id="{6710236A-F3E1-EA14-729B-0F5E7974B2C5}"/>
+              </a:ext>
+            </a:extLst>
+          </p:cNvPr>
+          <p:cNvSpPr>
+            <a:spLocks noGrp="1"/>
+          </p:cNvSpPr>
+          <p:nvPr>
+            <p:ph type="title"/>
+          </p:nvPr>
+        </p:nvSpPr>
+        <p:spPr/>
+        <p:txBody>
+          <a:bodyPr/>
+          <a:lstStyle/>
+          <a:p>
+            <a:r>
+              <a:rPr lang="fr-FR" dirty="0"/>
+              <a:t>Conclusion</a:t>
+            </a:r>
+          </a:p>
+        </p:txBody>
+      </p:sp>
+      <p:sp>
+        <p:nvSpPr>
+          <p:cNvPr id="3" name="Espace réservé du contenu 2">
+            <a:extLst>
+              <a:ext uri="{FF2B5EF4-FFF2-40B4-BE49-F238E27FC236}">
+                <a16:creationId xmlns:a16="http://schemas.microsoft.com/office/drawing/2014/main" id="{07EA5922-9EC5-668F-39FE-BC7092D75F2C}"/>
+              </a:ext>
+            </a:extLst>
+          </p:cNvPr>
+          <p:cNvSpPr>
+            <a:spLocks noGrp="1"/>
+          </p:cNvSpPr>
+          <p:nvPr>
+            <p:ph idx="1"/>
+          </p:nvPr>
+        </p:nvSpPr>
+        <p:spPr/>
+        <p:txBody>
+          <a:bodyPr/>
+          <a:lstStyle/>
+          <a:p>
+            <a:endParaRPr lang="fr-FR"/>
+          </a:p>
+        </p:txBody>
+      </p:sp>
+    </p:spTree>
+    <p:extLst>
+      <p:ext uri="{BB962C8B-B14F-4D97-AF65-F5344CB8AC3E}">
+        <p14:creationId xmlns:p14="http://schemas.microsoft.com/office/powerpoint/2010/main" val="2628198356"/>
       </p:ext>
     </p:extLst>
   </p:cSld>
@@ -3676,7 +3930,7 @@
           <a:p>
             <a:r>
               <a:rPr lang="fr-FR" dirty="0"/>
-              <a:t>Main ad</a:t>
+              <a:t>Pubs</a:t>
             </a:r>
           </a:p>
         </p:txBody>
@@ -3702,7 +3956,79 @@
           <a:bodyPr/>
           <a:lstStyle/>
           <a:p>
-            <a:endParaRPr lang="fr-FR"/>
+            <a:r>
+              <a:rPr lang="fr-FR" dirty="0"/>
+              <a:t>US: </a:t>
+            </a:r>
+            <a:r>
+              <a:rPr lang="fr-FR" dirty="0">
+                <a:hlinkClick r:id="rId2"/>
+              </a:rPr>
+              <a:t>https://www.youtube.com/watch?v=6mx0t0ex7y8</a:t>
+            </a:r>
+            <a:endParaRPr lang="fr-FR" dirty="0"/>
+          </a:p>
+          <a:p>
+            <a:pPr lvl="1"/>
+            <a:r>
+              <a:rPr lang="fr-FR" dirty="0"/>
+              <a:t>Pas de visage</a:t>
+            </a:r>
+          </a:p>
+          <a:p>
+            <a:pPr lvl="1"/>
+            <a:r>
+              <a:rPr lang="fr-FR" dirty="0"/>
+              <a:t>Réseaux sociaux</a:t>
+            </a:r>
+          </a:p>
+          <a:p>
+            <a:r>
+              <a:rPr lang="fr-FR" dirty="0"/>
+              <a:t>Singapour: </a:t>
+            </a:r>
+            <a:r>
+              <a:rPr lang="fr-FR" dirty="0">
+                <a:hlinkClick r:id="rId3"/>
+              </a:rPr>
+              <a:t>https://www.youtube.com/watch?v=taOdaf_nw3U</a:t>
+            </a:r>
+            <a:endParaRPr lang="fr-FR" dirty="0"/>
+          </a:p>
+          <a:p>
+            <a:pPr lvl="1"/>
+            <a:r>
+              <a:rPr lang="fr-FR" dirty="0"/>
+              <a:t>Valeurs de famille, spiritualité (religion: 15% de musulmans)</a:t>
+            </a:r>
+          </a:p>
+          <a:p>
+            <a:pPr lvl="1"/>
+            <a:r>
+              <a:rPr lang="fr-FR" dirty="0"/>
+              <a:t>Récompense</a:t>
+            </a:r>
+          </a:p>
+          <a:p>
+            <a:pPr lvl="1"/>
+            <a:r>
+              <a:rPr lang="fr-FR" dirty="0"/>
+              <a:t>Visuel (couleurs chaudes), musique douce</a:t>
+            </a:r>
+          </a:p>
+          <a:p>
+            <a:pPr lvl="1"/>
+            <a:r>
+              <a:rPr lang="fr-FR" dirty="0"/>
+              <a:t>Vêtements locaux</a:t>
+            </a:r>
+          </a:p>
+          <a:p>
+            <a:pPr lvl="1"/>
+            <a:r>
+              <a:rPr lang="fr-FR" dirty="0"/>
+              <a:t>Marque inclusive</a:t>
+            </a:r>
           </a:p>
         </p:txBody>
       </p:sp>
@@ -3741,7 +4067,7 @@
           <p:cNvPr id="2" name="Titre 1">
             <a:extLst>
               <a:ext uri="{FF2B5EF4-FFF2-40B4-BE49-F238E27FC236}">
-                <a16:creationId xmlns:a16="http://schemas.microsoft.com/office/drawing/2014/main" id="{2397AC9A-E99F-A092-7C65-95625EDBCF55}"/>
+                <a16:creationId xmlns:a16="http://schemas.microsoft.com/office/drawing/2014/main" id="{76C75DD8-94C8-07EE-F736-20EF16313A64}"/>
               </a:ext>
             </a:extLst>
           </p:cNvPr>
@@ -3758,9 +4084,10 @@
           <a:lstStyle/>
           <a:p>
             <a:r>
-              <a:rPr lang="fr-FR" dirty="0"/>
-              <a:t>Ad 1</a:t>
-            </a:r>
+              <a:rPr lang="fr-FR"/>
+              <a:t>Pubs</a:t>
+            </a:r>
+            <a:endParaRPr lang="fr-FR" dirty="0"/>
           </a:p>
         </p:txBody>
       </p:sp>
@@ -3769,7 +4096,7 @@
           <p:cNvPr id="3" name="Espace réservé du contenu 2">
             <a:extLst>
               <a:ext uri="{FF2B5EF4-FFF2-40B4-BE49-F238E27FC236}">
-                <a16:creationId xmlns:a16="http://schemas.microsoft.com/office/drawing/2014/main" id="{B21100F3-583F-E11F-7F37-7C29B4903101}"/>
+                <a16:creationId xmlns:a16="http://schemas.microsoft.com/office/drawing/2014/main" id="{FA7FEAB5-4E10-2CC9-0A3A-4840FD8D70D7}"/>
               </a:ext>
             </a:extLst>
           </p:cNvPr>
@@ -3785,14 +4112,39 @@
           <a:bodyPr/>
           <a:lstStyle/>
           <a:p>
-            <a:endParaRPr lang="fr-FR"/>
+            <a:r>
+              <a:rPr lang="fr-FR" dirty="0"/>
+              <a:t>France: </a:t>
+            </a:r>
+            <a:r>
+              <a:rPr lang="fr-FR" dirty="0">
+                <a:hlinkClick r:id="rId2"/>
+              </a:rPr>
+              <a:t>https://www.youtube.com/watch?v=q1gfefGeUZI</a:t>
+            </a:r>
+            <a:endParaRPr lang="fr-FR" dirty="0"/>
+          </a:p>
+          <a:p>
+            <a:pPr lvl="1"/>
+            <a:r>
+              <a:rPr lang="fr-FR" dirty="0"/>
+              <a:t>Égalité des places / égalité des chances </a:t>
+            </a:r>
+            <a:r>
+              <a:rPr lang="fr-FR"/>
+              <a:t>(François Dubet)</a:t>
+            </a:r>
+            <a:endParaRPr lang="fr-FR" dirty="0"/>
+          </a:p>
+          <a:p>
+            <a:endParaRPr lang="fr-FR" dirty="0"/>
           </a:p>
         </p:txBody>
       </p:sp>
     </p:spTree>
     <p:extLst>
       <p:ext uri="{BB962C8B-B14F-4D97-AF65-F5344CB8AC3E}">
-        <p14:creationId xmlns:p14="http://schemas.microsoft.com/office/powerpoint/2010/main" val="1266644878"/>
+        <p14:creationId xmlns:p14="http://schemas.microsoft.com/office/powerpoint/2010/main" val="3666044198"/>
       </p:ext>
     </p:extLst>
   </p:cSld>
@@ -3824,7 +4176,7 @@
           <p:cNvPr id="2" name="Titre 1">
             <a:extLst>
               <a:ext uri="{FF2B5EF4-FFF2-40B4-BE49-F238E27FC236}">
-                <a16:creationId xmlns:a16="http://schemas.microsoft.com/office/drawing/2014/main" id="{522C4C2C-527E-C1FC-1097-F738F90238DF}"/>
+                <a16:creationId xmlns:a16="http://schemas.microsoft.com/office/drawing/2014/main" id="{2397AC9A-E99F-A092-7C65-95625EDBCF55}"/>
               </a:ext>
             </a:extLst>
           </p:cNvPr>
@@ -3842,7 +4194,7 @@
           <a:p>
             <a:r>
               <a:rPr lang="fr-FR" dirty="0"/>
-              <a:t>Ad 2</a:t>
+              <a:t>Ad 1</a:t>
             </a:r>
           </a:p>
         </p:txBody>
@@ -3852,7 +4204,7 @@
           <p:cNvPr id="3" name="Espace réservé du contenu 2">
             <a:extLst>
               <a:ext uri="{FF2B5EF4-FFF2-40B4-BE49-F238E27FC236}">
-                <a16:creationId xmlns:a16="http://schemas.microsoft.com/office/drawing/2014/main" id="{F5C57BE3-D20B-B668-EFE6-E68FB43507B3}"/>
+                <a16:creationId xmlns:a16="http://schemas.microsoft.com/office/drawing/2014/main" id="{B21100F3-583F-E11F-7F37-7C29B4903101}"/>
               </a:ext>
             </a:extLst>
           </p:cNvPr>
@@ -3875,7 +4227,7 @@
     </p:spTree>
     <p:extLst>
       <p:ext uri="{BB962C8B-B14F-4D97-AF65-F5344CB8AC3E}">
-        <p14:creationId xmlns:p14="http://schemas.microsoft.com/office/powerpoint/2010/main" val="3117585510"/>
+        <p14:creationId xmlns:p14="http://schemas.microsoft.com/office/powerpoint/2010/main" val="1266644878"/>
       </p:ext>
     </p:extLst>
   </p:cSld>
@@ -3907,7 +4259,7 @@
           <p:cNvPr id="2" name="Titre 1">
             <a:extLst>
               <a:ext uri="{FF2B5EF4-FFF2-40B4-BE49-F238E27FC236}">
-                <a16:creationId xmlns:a16="http://schemas.microsoft.com/office/drawing/2014/main" id="{D2BF8FFB-A9F5-2903-8159-B3C8E9C09669}"/>
+                <a16:creationId xmlns:a16="http://schemas.microsoft.com/office/drawing/2014/main" id="{522C4C2C-527E-C1FC-1097-F738F90238DF}"/>
               </a:ext>
             </a:extLst>
           </p:cNvPr>
@@ -3925,7 +4277,7 @@
           <a:p>
             <a:r>
               <a:rPr lang="fr-FR" dirty="0"/>
-              <a:t>Ad 3</a:t>
+              <a:t>Ad 2</a:t>
             </a:r>
           </a:p>
         </p:txBody>
@@ -3935,7 +4287,7 @@
           <p:cNvPr id="3" name="Espace réservé du contenu 2">
             <a:extLst>
               <a:ext uri="{FF2B5EF4-FFF2-40B4-BE49-F238E27FC236}">
-                <a16:creationId xmlns:a16="http://schemas.microsoft.com/office/drawing/2014/main" id="{90D45A24-6C33-6841-D450-E17292BA9BE3}"/>
+                <a16:creationId xmlns:a16="http://schemas.microsoft.com/office/drawing/2014/main" id="{F5C57BE3-D20B-B668-EFE6-E68FB43507B3}"/>
               </a:ext>
             </a:extLst>
           </p:cNvPr>
@@ -3958,7 +4310,7 @@
     </p:spTree>
     <p:extLst>
       <p:ext uri="{BB962C8B-B14F-4D97-AF65-F5344CB8AC3E}">
-        <p14:creationId xmlns:p14="http://schemas.microsoft.com/office/powerpoint/2010/main" val="3045138478"/>
+        <p14:creationId xmlns:p14="http://schemas.microsoft.com/office/powerpoint/2010/main" val="3117585510"/>
       </p:ext>
     </p:extLst>
   </p:cSld>
@@ -3990,7 +4342,7 @@
           <p:cNvPr id="2" name="Titre 1">
             <a:extLst>
               <a:ext uri="{FF2B5EF4-FFF2-40B4-BE49-F238E27FC236}">
-                <a16:creationId xmlns:a16="http://schemas.microsoft.com/office/drawing/2014/main" id="{0BF80959-2A11-13D9-66AC-A51389286477}"/>
+                <a16:creationId xmlns:a16="http://schemas.microsoft.com/office/drawing/2014/main" id="{D2BF8FFB-A9F5-2903-8159-B3C8E9C09669}"/>
               </a:ext>
             </a:extLst>
           </p:cNvPr>
@@ -4008,21 +4360,8 @@
           <a:p>
             <a:r>
               <a:rPr lang="fr-FR" dirty="0"/>
-              <a:t>Culture-</a:t>
-            </a:r>
-            <a:r>
-              <a:rPr lang="fr-FR" dirty="0" err="1"/>
-              <a:t>dependent</a:t>
-            </a:r>
-            <a:r>
-              <a:rPr lang="fr-FR" dirty="0"/>
-              <a:t> </a:t>
-            </a:r>
-            <a:r>
-              <a:rPr lang="fr-FR" dirty="0" err="1"/>
-              <a:t>products</a:t>
-            </a:r>
-            <a:endParaRPr lang="fr-FR" dirty="0"/>
+              <a:t>Ad 3</a:t>
+            </a:r>
           </a:p>
         </p:txBody>
       </p:sp>
@@ -4031,7 +4370,7 @@
           <p:cNvPr id="3" name="Espace réservé du contenu 2">
             <a:extLst>
               <a:ext uri="{FF2B5EF4-FFF2-40B4-BE49-F238E27FC236}">
-                <a16:creationId xmlns:a16="http://schemas.microsoft.com/office/drawing/2014/main" id="{E3E53974-D937-72BD-CFEA-05BB1F17F976}"/>
+                <a16:creationId xmlns:a16="http://schemas.microsoft.com/office/drawing/2014/main" id="{90D45A24-6C33-6841-D450-E17292BA9BE3}"/>
               </a:ext>
             </a:extLst>
           </p:cNvPr>
@@ -4054,7 +4393,7 @@
     </p:spTree>
     <p:extLst>
       <p:ext uri="{BB962C8B-B14F-4D97-AF65-F5344CB8AC3E}">
-        <p14:creationId xmlns:p14="http://schemas.microsoft.com/office/powerpoint/2010/main" val="3192538769"/>
+        <p14:creationId xmlns:p14="http://schemas.microsoft.com/office/powerpoint/2010/main" val="3045138478"/>
       </p:ext>
     </p:extLst>
   </p:cSld>
@@ -4086,7 +4425,7 @@
           <p:cNvPr id="2" name="Titre 1">
             <a:extLst>
               <a:ext uri="{FF2B5EF4-FFF2-40B4-BE49-F238E27FC236}">
-                <a16:creationId xmlns:a16="http://schemas.microsoft.com/office/drawing/2014/main" id="{906E8B0C-5C7E-5A15-2386-8BEC2D521FA1}"/>
+                <a16:creationId xmlns:a16="http://schemas.microsoft.com/office/drawing/2014/main" id="{0BF80959-2A11-13D9-66AC-A51389286477}"/>
               </a:ext>
             </a:extLst>
           </p:cNvPr>
@@ -4104,7 +4443,7 @@
           <a:p>
             <a:r>
               <a:rPr lang="fr-FR" dirty="0"/>
-              <a:t>Transition</a:t>
+              <a:t>Arguments</a:t>
             </a:r>
           </a:p>
         </p:txBody>
@@ -4114,7 +4453,7 @@
           <p:cNvPr id="3" name="Espace réservé du contenu 2">
             <a:extLst>
               <a:ext uri="{FF2B5EF4-FFF2-40B4-BE49-F238E27FC236}">
-                <a16:creationId xmlns:a16="http://schemas.microsoft.com/office/drawing/2014/main" id="{CEA83A4A-3018-9E87-5FCC-6FB174757F37}"/>
+                <a16:creationId xmlns:a16="http://schemas.microsoft.com/office/drawing/2014/main" id="{E3E53974-D937-72BD-CFEA-05BB1F17F976}"/>
               </a:ext>
             </a:extLst>
           </p:cNvPr>
@@ -4131,20 +4470,19 @@
           <a:lstStyle/>
           <a:p>
             <a:r>
-              <a:rPr lang="fr-FR" dirty="0" err="1"/>
-              <a:t>Recall</a:t>
-            </a:r>
-            <a:r>
-              <a:rPr lang="fr-FR" dirty="0"/>
-              <a:t> of main ad</a:t>
-            </a:r>
+              <a:rPr lang="fr-FR" dirty="0"/>
+              <a:t>Produits dépendant de la culture</a:t>
+            </a:r>
+          </a:p>
+          <a:p>
+            <a:endParaRPr lang="fr-FR" dirty="0"/>
           </a:p>
         </p:txBody>
       </p:sp>
     </p:spTree>
     <p:extLst>
       <p:ext uri="{BB962C8B-B14F-4D97-AF65-F5344CB8AC3E}">
-        <p14:creationId xmlns:p14="http://schemas.microsoft.com/office/powerpoint/2010/main" val="687676604"/>
+        <p14:creationId xmlns:p14="http://schemas.microsoft.com/office/powerpoint/2010/main" val="3192538769"/>
       </p:ext>
     </p:extLst>
   </p:cSld>
@@ -4176,7 +4514,7 @@
           <p:cNvPr id="2" name="Titre 1">
             <a:extLst>
               <a:ext uri="{FF2B5EF4-FFF2-40B4-BE49-F238E27FC236}">
-                <a16:creationId xmlns:a16="http://schemas.microsoft.com/office/drawing/2014/main" id="{3AE29807-5EE9-D086-72BF-25583740A81F}"/>
+                <a16:creationId xmlns:a16="http://schemas.microsoft.com/office/drawing/2014/main" id="{906E8B0C-5C7E-5A15-2386-8BEC2D521FA1}"/>
               </a:ext>
             </a:extLst>
           </p:cNvPr>
@@ -4194,7 +4532,7 @@
           <a:p>
             <a:r>
               <a:rPr lang="fr-FR" dirty="0"/>
-              <a:t>Culture clash</a:t>
+              <a:t>Transition</a:t>
             </a:r>
           </a:p>
         </p:txBody>
@@ -4204,7 +4542,7 @@
           <p:cNvPr id="3" name="Espace réservé du contenu 2">
             <a:extLst>
               <a:ext uri="{FF2B5EF4-FFF2-40B4-BE49-F238E27FC236}">
-                <a16:creationId xmlns:a16="http://schemas.microsoft.com/office/drawing/2014/main" id="{F19D04C4-A8EC-B9EB-9047-9DA7E0C0E8A8}"/>
+                <a16:creationId xmlns:a16="http://schemas.microsoft.com/office/drawing/2014/main" id="{CEA83A4A-3018-9E87-5FCC-6FB174757F37}"/>
               </a:ext>
             </a:extLst>
           </p:cNvPr>
@@ -4221,86 +4559,12 @@
           <a:lstStyle/>
           <a:p>
             <a:r>
-              <a:rPr lang="fr-FR" dirty="0"/>
-              <a:t>Arg 1</a:t>
-            </a:r>
-          </a:p>
-          <a:p>
-            <a:pPr lvl="1"/>
-            <a:r>
               <a:rPr lang="fr-FR" dirty="0" err="1"/>
-              <a:t>Sub</a:t>
-            </a:r>
-            <a:r>
-              <a:rPr lang="fr-FR" dirty="0"/>
-              <a:t> arg 1</a:t>
-            </a:r>
-          </a:p>
-          <a:p>
-            <a:pPr lvl="1"/>
-            <a:r>
-              <a:rPr lang="fr-FR" dirty="0" err="1"/>
-              <a:t>Sub</a:t>
-            </a:r>
-            <a:r>
-              <a:rPr lang="fr-FR" dirty="0"/>
-              <a:t> arg 2</a:t>
-            </a:r>
-          </a:p>
-          <a:p>
-            <a:r>
-              <a:rPr lang="fr-FR" dirty="0"/>
-              <a:t>Arg 2</a:t>
-            </a:r>
-          </a:p>
-          <a:p>
-            <a:pPr lvl="1"/>
-            <a:r>
-              <a:rPr lang="fr-FR" dirty="0" err="1"/>
-              <a:t>Sub</a:t>
-            </a:r>
-            <a:r>
-              <a:rPr lang="fr-FR" dirty="0"/>
-              <a:t> arg 1</a:t>
-            </a:r>
-          </a:p>
-          <a:p>
-            <a:pPr lvl="1"/>
-            <a:r>
-              <a:rPr lang="fr-FR" dirty="0" err="1"/>
-              <a:t>Sub</a:t>
-            </a:r>
-            <a:r>
-              <a:rPr lang="fr-FR" dirty="0"/>
-              <a:t> arg 2</a:t>
-            </a:r>
-          </a:p>
-          <a:p>
-            <a:r>
-              <a:rPr lang="fr-FR" dirty="0"/>
-              <a:t>Arg 3</a:t>
-            </a:r>
-          </a:p>
-          <a:p>
-            <a:pPr lvl="1"/>
-            <a:r>
-              <a:rPr lang="fr-FR" dirty="0" err="1"/>
-              <a:t>Sub</a:t>
-            </a:r>
-            <a:r>
-              <a:rPr lang="fr-FR" dirty="0"/>
-              <a:t> arg 1</a:t>
-            </a:r>
-          </a:p>
-          <a:p>
-            <a:pPr lvl="1"/>
-            <a:r>
-              <a:rPr lang="fr-FR" dirty="0" err="1"/>
-              <a:t>Sub</a:t>
-            </a:r>
-            <a:r>
-              <a:rPr lang="fr-FR" dirty="0"/>
-              <a:t> arg 2</a:t>
+              <a:t>Recall</a:t>
+            </a:r>
+            <a:r>
+              <a:rPr lang="fr-FR" dirty="0"/>
+              <a:t> of main ad</a:t>
             </a:r>
           </a:p>
         </p:txBody>
@@ -4308,7 +4572,7 @@
     </p:spTree>
     <p:extLst>
       <p:ext uri="{BB962C8B-B14F-4D97-AF65-F5344CB8AC3E}">
-        <p14:creationId xmlns:p14="http://schemas.microsoft.com/office/powerpoint/2010/main" val="713119767"/>
+        <p14:creationId xmlns:p14="http://schemas.microsoft.com/office/powerpoint/2010/main" val="687676604"/>
       </p:ext>
     </p:extLst>
   </p:cSld>
@@ -4386,7 +4650,7 @@
           <a:p>
             <a:r>
               <a:rPr lang="fr-FR" dirty="0"/>
-              <a:t>Arg 4</a:t>
+              <a:t>Arg 1</a:t>
             </a:r>
           </a:p>
           <a:p>
@@ -4414,7 +4678,7 @@
           <a:p>
             <a:r>
               <a:rPr lang="fr-FR" dirty="0"/>
-              <a:t>Arg 5</a:t>
+              <a:t>Arg 2</a:t>
             </a:r>
           </a:p>
           <a:p>
@@ -4442,7 +4706,7 @@
           <a:p>
             <a:r>
               <a:rPr lang="fr-FR" dirty="0"/>
-              <a:t>Arg 6</a:t>
+              <a:t>Arg 3</a:t>
             </a:r>
           </a:p>
           <a:p>
@@ -4472,7 +4736,7 @@
     </p:spTree>
     <p:extLst>
       <p:ext uri="{BB962C8B-B14F-4D97-AF65-F5344CB8AC3E}">
-        <p14:creationId xmlns:p14="http://schemas.microsoft.com/office/powerpoint/2010/main" val="3683918389"/>
+        <p14:creationId xmlns:p14="http://schemas.microsoft.com/office/powerpoint/2010/main" val="713119767"/>
       </p:ext>
     </p:extLst>
   </p:cSld>

</xml_diff>